<commit_message>
Added published facebook test link in assessment slides
</commit_message>
<xml_diff>
--- a/FabrikamFood/Assessment Slides/MSA Assessment Deck.pptx
+++ b/FabrikamFood/Assessment Slides/MSA Assessment Deck.pptx
@@ -1276,8 +1276,8 @@
     <dgm:cxn modelId="{5F7B1DF5-D2F3-4DF4-8926-ADCD1EC89886}" srcId="{725EC3CF-605F-4044-8261-6E4C6CF64C7E}" destId="{864DEF7C-7104-41E4-8F36-06724AF88F68}" srcOrd="4" destOrd="0" parTransId="{1C0F8FB2-7A28-4415-BB91-33632F5627C9}" sibTransId="{21FDE9FE-AB6A-4B60-82AB-221077826A0C}"/>
     <dgm:cxn modelId="{E6F65C0D-EEAB-4834-ADA3-2F96029D0B76}" type="presOf" srcId="{21FDE9FE-AB6A-4B60-82AB-221077826A0C}" destId="{35ED317F-3094-4BAE-8EEF-1E292B242480}" srcOrd="0" destOrd="0" presId="urn:microsoft.com/office/officeart/2005/8/layout/process1"/>
     <dgm:cxn modelId="{4F3A5363-8C02-478C-91F2-9288B1505313}" type="presOf" srcId="{AB04FBBC-2D69-403B-B13E-772E54357C42}" destId="{80522D78-E433-4FB3-8CB8-369BF0AE705D}" srcOrd="0" destOrd="0" presId="urn:microsoft.com/office/officeart/2005/8/layout/process1"/>
+    <dgm:cxn modelId="{EAFDCFF9-A2C4-4608-B721-5547A15F351A}" type="presOf" srcId="{B26A213D-444A-4203-B0C2-F36091A662D8}" destId="{4B45D584-0ECB-491D-9826-E7B697758D30}" srcOrd="1" destOrd="0" presId="urn:microsoft.com/office/officeart/2005/8/layout/process1"/>
     <dgm:cxn modelId="{D6126DBC-7FD1-45E1-9CC1-63E72697D3E8}" type="presOf" srcId="{32DC0C73-5679-43CD-9D9A-E9995C2F8320}" destId="{F6C3EA0D-EA6C-4AC1-94C4-10E78110E1F4}" srcOrd="0" destOrd="0" presId="urn:microsoft.com/office/officeart/2005/8/layout/process1"/>
-    <dgm:cxn modelId="{EAFDCFF9-A2C4-4608-B721-5547A15F351A}" type="presOf" srcId="{B26A213D-444A-4203-B0C2-F36091A662D8}" destId="{4B45D584-0ECB-491D-9826-E7B697758D30}" srcOrd="1" destOrd="0" presId="urn:microsoft.com/office/officeart/2005/8/layout/process1"/>
     <dgm:cxn modelId="{5BBB14F6-C674-4B80-8A14-B042A729181F}" type="presOf" srcId="{4D34CA92-264A-440C-AB97-DF539BD02CB5}" destId="{5618EC7C-46C9-474A-9BAD-43AEEFB2CE2D}" srcOrd="1" destOrd="0" presId="urn:microsoft.com/office/officeart/2005/8/layout/process1"/>
     <dgm:cxn modelId="{CDBC728C-5E11-41DD-901E-53ADFEB366BE}" type="presOf" srcId="{21FDE9FE-AB6A-4B60-82AB-221077826A0C}" destId="{74932EA7-3DD6-4172-8F82-4920313FC1B8}" srcOrd="1" destOrd="0" presId="urn:microsoft.com/office/officeart/2005/8/layout/process1"/>
     <dgm:cxn modelId="{88CF86F1-5525-4873-9E41-B7AB5917B1B9}" type="presOf" srcId="{7E0DF898-4B07-4F3F-8130-D929123A2167}" destId="{B4FDA118-6EE8-4320-B8FB-972E03E7CB69}" srcOrd="0" destOrd="0" presId="urn:microsoft.com/office/officeart/2005/8/layout/process1"/>
@@ -6954,7 +6954,7 @@
         </p:nvSpPr>
         <p:spPr>
           <a:xfrm>
-            <a:off x="838200" y="2715087"/>
+            <a:off x="838200" y="1825625"/>
             <a:ext cx="5496098" cy="3910157"/>
           </a:xfrm>
         </p:spPr>
@@ -6987,6 +6987,37 @@
               <a:rPr lang="en-NZ" dirty="0"/>
               <a:t>Build a community around the lore?</a:t>
             </a:r>
+          </a:p>
+          <a:p>
+            <a:pPr lvl="1"/>
+            <a:endParaRPr lang="en-NZ" dirty="0"/>
+          </a:p>
+          <a:p>
+            <a:pPr lvl="1"/>
+            <a:endParaRPr lang="en-NZ" dirty="0"/>
+          </a:p>
+          <a:p>
+            <a:r>
+              <a:rPr lang="en-NZ" dirty="0"/>
+              <a:t>Messenger</a:t>
+            </a:r>
+          </a:p>
+          <a:p>
+            <a:pPr lvl="1"/>
+            <a:r>
+              <a:rPr lang="en-NZ" sz="1600" dirty="0"/>
+              <a:t>https://www.messenger.com/t/PhineasFabrikam</a:t>
+            </a:r>
+          </a:p>
+          <a:p>
+            <a:pPr lvl="1"/>
+            <a:endParaRPr lang="en-NZ" dirty="0"/>
+          </a:p>
+          <a:p>
+            <a:pPr marL="457200" lvl="1" indent="0">
+              <a:buNone/>
+            </a:pPr>
+            <a:endParaRPr lang="en-NZ" dirty="0"/>
           </a:p>
           <a:p>
             <a:pPr lvl="1"/>

</xml_diff>